<commit_message>
Update report and architecture ppt
</commit_message>
<xml_diff>
--- a/Architecture.pptx
+++ b/Architecture.pptx
@@ -104,6 +104,11 @@
       </a:defRPr>
     </a:lvl9pPr>
   </p:defaultTextStyle>
+  <p:extLst>
+    <p:ext uri="{EFAFB233-063F-42B5-8137-9DF3F51BA10A}">
+      <p15:sldGuideLst xmlns:p15="http://schemas.microsoft.com/office/powerpoint/2012/main"/>
+    </p:ext>
+  </p:extLst>
 </p:presentation>
 </file>
 
@@ -3243,8 +3248,8 @@
         </p:nvCxnSpPr>
         <p:spPr>
           <a:xfrm flipH="1" flipV="1">
-            <a:off x="8593166" y="280975"/>
-            <a:ext cx="2282419" cy="6983"/>
+            <a:off x="8613775" y="282913"/>
+            <a:ext cx="2270024" cy="10988"/>
           </a:xfrm>
           <a:prstGeom prst="line">
             <a:avLst/>
@@ -3844,7 +3849,7 @@
         </p:nvSpPr>
         <p:spPr>
           <a:xfrm>
-            <a:off x="9802532" y="4153799"/>
+            <a:off x="9802532" y="4104575"/>
             <a:ext cx="457200" cy="307777"/>
           </a:xfrm>
           <a:prstGeom prst="rect">
@@ -3882,7 +3887,7 @@
         </p:nvSpPr>
         <p:spPr>
           <a:xfrm>
-            <a:off x="9422315" y="4567476"/>
+            <a:off x="9414762" y="4560668"/>
             <a:ext cx="457200" cy="307777"/>
           </a:xfrm>
           <a:prstGeom prst="rect">
@@ -4376,8 +4381,8 @@
         </p:nvCxnSpPr>
         <p:spPr>
           <a:xfrm flipH="1" flipV="1">
-            <a:off x="7504741" y="2480733"/>
-            <a:ext cx="5668" cy="1291774"/>
+            <a:off x="7513879" y="2654295"/>
+            <a:ext cx="8735" cy="1128074"/>
           </a:xfrm>
           <a:prstGeom prst="line">
             <a:avLst/>
@@ -4410,9 +4415,9 @@
           <p:nvPr/>
         </p:nvCxnSpPr>
         <p:spPr>
-          <a:xfrm flipV="1">
-            <a:off x="6357991" y="1611865"/>
-            <a:ext cx="1713" cy="868868"/>
+          <a:xfrm flipH="1" flipV="1">
+            <a:off x="6359704" y="1611865"/>
+            <a:ext cx="4863" cy="1052056"/>
           </a:xfrm>
           <a:prstGeom prst="line">
             <a:avLst/>
@@ -4446,7 +4451,7 @@
         </p:nvCxnSpPr>
         <p:spPr>
           <a:xfrm flipH="1">
-            <a:off x="6353758" y="2480733"/>
+            <a:off x="6362224" y="2654295"/>
             <a:ext cx="1162525" cy="0"/>
           </a:xfrm>
           <a:prstGeom prst="line">
@@ -4481,8 +4486,8 @@
         </p:nvCxnSpPr>
         <p:spPr>
           <a:xfrm flipH="1">
-            <a:off x="5212809" y="1611865"/>
-            <a:ext cx="1164455" cy="0"/>
+            <a:off x="5212810" y="1611865"/>
+            <a:ext cx="1159415" cy="0"/>
           </a:xfrm>
           <a:prstGeom prst="line">
             <a:avLst/>
@@ -4548,59 +4553,13 @@
       </p:sp>
       <p:sp>
         <p:nvSpPr>
-          <p:cNvPr id="149" name="Rectangle 148"/>
-          <p:cNvSpPr/>
-          <p:nvPr/>
-        </p:nvSpPr>
-        <p:spPr>
-          <a:xfrm>
-            <a:off x="5503059" y="2046299"/>
-            <a:ext cx="473832" cy="143181"/>
-          </a:xfrm>
-          <a:prstGeom prst="rect">
-            <a:avLst/>
-          </a:prstGeom>
-          <a:solidFill>
-            <a:schemeClr val="bg1"/>
-          </a:solidFill>
-          <a:ln>
-            <a:noFill/>
-          </a:ln>
-        </p:spPr>
-        <p:style>
-          <a:lnRef idx="2">
-            <a:schemeClr val="accent1">
-              <a:shade val="50000"/>
-            </a:schemeClr>
-          </a:lnRef>
-          <a:fillRef idx="1">
-            <a:schemeClr val="accent1"/>
-          </a:fillRef>
-          <a:effectRef idx="0">
-            <a:schemeClr val="accent1"/>
-          </a:effectRef>
-          <a:fontRef idx="minor">
-            <a:schemeClr val="lt1"/>
-          </a:fontRef>
-        </p:style>
-        <p:txBody>
-          <a:bodyPr rtlCol="0" anchor="ctr"/>
-          <a:lstStyle/>
-          <a:p>
-            <a:pPr algn="ctr"/>
-            <a:endParaRPr lang="en-US"/>
-          </a:p>
-        </p:txBody>
-      </p:sp>
-      <p:sp>
-        <p:nvSpPr>
           <p:cNvPr id="148" name="TextBox 147"/>
           <p:cNvSpPr txBox="1"/>
           <p:nvPr/>
         </p:nvSpPr>
         <p:spPr>
           <a:xfrm>
-            <a:off x="5420017" y="1979389"/>
+            <a:off x="5410072" y="1725935"/>
             <a:ext cx="838296" cy="276999"/>
           </a:xfrm>
           <a:prstGeom prst="rect">
@@ -4745,8 +4704,8 @@
         </p:nvCxnSpPr>
         <p:spPr>
           <a:xfrm flipH="1">
-            <a:off x="7801975" y="2215604"/>
-            <a:ext cx="716990" cy="7496"/>
+            <a:off x="7801106" y="2219711"/>
+            <a:ext cx="318982" cy="1430"/>
           </a:xfrm>
           <a:prstGeom prst="line">
             <a:avLst/>
@@ -4826,7 +4785,7 @@
         </p:nvGrpSpPr>
         <p:grpSpPr>
           <a:xfrm>
-            <a:off x="8316460" y="116138"/>
+            <a:off x="8346940" y="116138"/>
             <a:ext cx="305587" cy="588323"/>
             <a:chOff x="941506" y="548908"/>
             <a:chExt cx="305587" cy="567267"/>
@@ -4917,8 +4876,8 @@
         </p:nvCxnSpPr>
         <p:spPr>
           <a:xfrm flipH="1" flipV="1">
-            <a:off x="8593166" y="399747"/>
-            <a:ext cx="1587024" cy="4419"/>
+            <a:off x="8616701" y="396066"/>
+            <a:ext cx="1563489" cy="8101"/>
           </a:xfrm>
           <a:prstGeom prst="line">
             <a:avLst/>
@@ -4952,8 +4911,8 @@
         </p:nvCxnSpPr>
         <p:spPr>
           <a:xfrm flipH="1">
-            <a:off x="8573097" y="519052"/>
-            <a:ext cx="1296049" cy="0"/>
+            <a:off x="8616701" y="519052"/>
+            <a:ext cx="1266738" cy="0"/>
           </a:xfrm>
           <a:prstGeom prst="line">
             <a:avLst/>
@@ -5149,43 +5108,8 @@
         </p:nvCxnSpPr>
         <p:spPr>
           <a:xfrm>
-            <a:off x="8042097" y="2016993"/>
+            <a:off x="8042097" y="2078921"/>
             <a:ext cx="3904" cy="323202"/>
-          </a:xfrm>
-          <a:prstGeom prst="line">
-            <a:avLst/>
-          </a:prstGeom>
-          <a:ln w="22225">
-            <a:solidFill>
-              <a:srgbClr val="6AD4F5"/>
-            </a:solidFill>
-          </a:ln>
-        </p:spPr>
-        <p:style>
-          <a:lnRef idx="3">
-            <a:schemeClr val="accent1"/>
-          </a:lnRef>
-          <a:fillRef idx="0">
-            <a:schemeClr val="accent1"/>
-          </a:fillRef>
-          <a:effectRef idx="2">
-            <a:schemeClr val="accent1"/>
-          </a:effectRef>
-          <a:fontRef idx="minor">
-            <a:schemeClr val="tx1"/>
-          </a:fontRef>
-        </p:style>
-      </p:cxnSp>
-      <p:cxnSp>
-        <p:nvCxnSpPr>
-          <p:cNvPr id="198" name="Straight Connector 197"/>
-          <p:cNvCxnSpPr/>
-          <p:nvPr/>
-        </p:nvCxnSpPr>
-        <p:spPr>
-          <a:xfrm>
-            <a:off x="8440283" y="667610"/>
-            <a:ext cx="4569" cy="1233781"/>
           </a:xfrm>
           <a:prstGeom prst="line">
             <a:avLst/>
@@ -5218,9 +5142,9 @@
           <p:nvPr/>
         </p:nvCxnSpPr>
         <p:spPr>
-          <a:xfrm>
-            <a:off x="8504360" y="672751"/>
-            <a:ext cx="5595" cy="1542853"/>
+          <a:xfrm flipH="1">
+            <a:off x="8503529" y="672751"/>
+            <a:ext cx="831" cy="1816067"/>
           </a:xfrm>
           <a:prstGeom prst="line">
             <a:avLst/>
@@ -5230,41 +5154,6 @@
               <a:srgbClr val="CC3300"/>
             </a:solidFill>
             <a:headEnd type="stealth" w="lg" len="lg"/>
-          </a:ln>
-        </p:spPr>
-        <p:style>
-          <a:lnRef idx="3">
-            <a:schemeClr val="accent1"/>
-          </a:lnRef>
-          <a:fillRef idx="0">
-            <a:schemeClr val="accent1"/>
-          </a:fillRef>
-          <a:effectRef idx="2">
-            <a:schemeClr val="accent1"/>
-          </a:effectRef>
-          <a:fontRef idx="minor">
-            <a:schemeClr val="tx1"/>
-          </a:fontRef>
-        </p:style>
-      </p:cxnSp>
-      <p:cxnSp>
-        <p:nvCxnSpPr>
-          <p:cNvPr id="206" name="Straight Connector 205"/>
-          <p:cNvCxnSpPr/>
-          <p:nvPr/>
-        </p:nvCxnSpPr>
-        <p:spPr>
-          <a:xfrm>
-            <a:off x="8443923" y="1496856"/>
-            <a:ext cx="2284" cy="530153"/>
-          </a:xfrm>
-          <a:prstGeom prst="line">
-            <a:avLst/>
-          </a:prstGeom>
-          <a:ln w="22225">
-            <a:solidFill>
-              <a:srgbClr val="6AD4F5"/>
-            </a:solidFill>
           </a:ln>
         </p:spPr>
         <p:style>
@@ -5289,9 +5178,9 @@
           <p:nvPr/>
         </p:nvCxnSpPr>
         <p:spPr>
-          <a:xfrm flipH="1">
-            <a:off x="8033915" y="2027009"/>
-            <a:ext cx="427210" cy="0"/>
+          <a:xfrm>
+            <a:off x="8043234" y="2092073"/>
+            <a:ext cx="76854" cy="615"/>
           </a:xfrm>
           <a:prstGeom prst="line">
             <a:avLst/>
@@ -5559,7 +5448,7 @@
         </p:nvCxnSpPr>
         <p:spPr>
           <a:xfrm flipH="1">
-            <a:off x="8541385" y="5437787"/>
+            <a:off x="8541385" y="5442867"/>
             <a:ext cx="730845" cy="0"/>
           </a:xfrm>
           <a:prstGeom prst="line">
@@ -6162,6 +6051,617 @@
               <a:t>ready</a:t>
             </a:r>
             <a:endParaRPr lang="en-US" sz="1000" dirty="0">
+              <a:solidFill>
+                <a:srgbClr val="CC3300"/>
+              </a:solidFill>
+            </a:endParaRPr>
+          </a:p>
+        </p:txBody>
+      </p:sp>
+      <p:sp>
+        <p:nvSpPr>
+          <p:cNvPr id="90" name="Oval 89"/>
+          <p:cNvSpPr/>
+          <p:nvPr/>
+        </p:nvSpPr>
+        <p:spPr>
+          <a:xfrm>
+            <a:off x="9717365" y="6361671"/>
+            <a:ext cx="66815" cy="69792"/>
+          </a:xfrm>
+          <a:prstGeom prst="ellipse">
+            <a:avLst/>
+          </a:prstGeom>
+          <a:solidFill>
+            <a:srgbClr val="272A30"/>
+          </a:solidFill>
+          <a:ln>
+            <a:noFill/>
+          </a:ln>
+        </p:spPr>
+        <p:style>
+          <a:lnRef idx="2">
+            <a:schemeClr val="accent1">
+              <a:shade val="50000"/>
+            </a:schemeClr>
+          </a:lnRef>
+          <a:fillRef idx="1">
+            <a:schemeClr val="accent1"/>
+          </a:fillRef>
+          <a:effectRef idx="0">
+            <a:schemeClr val="accent1"/>
+          </a:effectRef>
+          <a:fontRef idx="minor">
+            <a:schemeClr val="lt1"/>
+          </a:fontRef>
+        </p:style>
+        <p:txBody>
+          <a:bodyPr rtlCol="0" anchor="ctr"/>
+          <a:lstStyle/>
+          <a:p>
+            <a:pPr algn="ctr"/>
+            <a:endParaRPr lang="en-US"/>
+          </a:p>
+        </p:txBody>
+      </p:sp>
+      <p:sp>
+        <p:nvSpPr>
+          <p:cNvPr id="94" name="TextBox 93"/>
+          <p:cNvSpPr txBox="1"/>
+          <p:nvPr/>
+        </p:nvSpPr>
+        <p:spPr>
+          <a:xfrm>
+            <a:off x="8329942" y="112917"/>
+            <a:ext cx="457200" cy="276999"/>
+          </a:xfrm>
+          <a:prstGeom prst="rect">
+            <a:avLst/>
+          </a:prstGeom>
+          <a:noFill/>
+        </p:spPr>
+        <p:txBody>
+          <a:bodyPr wrap="square" rtlCol="0">
+            <a:spAutoFit/>
+          </a:bodyPr>
+          <a:lstStyle/>
+          <a:p>
+            <a:r>
+              <a:rPr lang="en-US" sz="1200" dirty="0" smtClean="0">
+                <a:solidFill>
+                  <a:srgbClr val="CC3300"/>
+                </a:solidFill>
+              </a:rPr>
+              <a:t>11</a:t>
+            </a:r>
+            <a:endParaRPr lang="en-US" sz="1200" dirty="0">
+              <a:solidFill>
+                <a:srgbClr val="CC3300"/>
+              </a:solidFill>
+            </a:endParaRPr>
+          </a:p>
+        </p:txBody>
+      </p:sp>
+      <p:sp>
+        <p:nvSpPr>
+          <p:cNvPr id="95" name="TextBox 94"/>
+          <p:cNvSpPr txBox="1"/>
+          <p:nvPr/>
+        </p:nvSpPr>
+        <p:spPr>
+          <a:xfrm>
+            <a:off x="8336292" y="259047"/>
+            <a:ext cx="457200" cy="276999"/>
+          </a:xfrm>
+          <a:prstGeom prst="rect">
+            <a:avLst/>
+          </a:prstGeom>
+          <a:noFill/>
+        </p:spPr>
+        <p:txBody>
+          <a:bodyPr wrap="square" rtlCol="0">
+            <a:spAutoFit/>
+          </a:bodyPr>
+          <a:lstStyle/>
+          <a:p>
+            <a:r>
+              <a:rPr lang="en-US" sz="1200" dirty="0" smtClean="0">
+                <a:solidFill>
+                  <a:srgbClr val="CC3300"/>
+                </a:solidFill>
+              </a:rPr>
+              <a:t>10</a:t>
+            </a:r>
+            <a:endParaRPr lang="en-US" sz="1200" dirty="0">
+              <a:solidFill>
+                <a:srgbClr val="CC3300"/>
+              </a:solidFill>
+            </a:endParaRPr>
+          </a:p>
+        </p:txBody>
+      </p:sp>
+      <p:sp>
+        <p:nvSpPr>
+          <p:cNvPr id="98" name="TextBox 97"/>
+          <p:cNvSpPr txBox="1"/>
+          <p:nvPr/>
+        </p:nvSpPr>
+        <p:spPr>
+          <a:xfrm>
+            <a:off x="8339979" y="400220"/>
+            <a:ext cx="457200" cy="276999"/>
+          </a:xfrm>
+          <a:prstGeom prst="rect">
+            <a:avLst/>
+          </a:prstGeom>
+          <a:noFill/>
+        </p:spPr>
+        <p:txBody>
+          <a:bodyPr wrap="square" rtlCol="0">
+            <a:spAutoFit/>
+          </a:bodyPr>
+          <a:lstStyle/>
+          <a:p>
+            <a:r>
+              <a:rPr lang="en-US" sz="1200" dirty="0" smtClean="0">
+                <a:solidFill>
+                  <a:srgbClr val="CC3300"/>
+                </a:solidFill>
+              </a:rPr>
+              <a:t>00</a:t>
+            </a:r>
+            <a:endParaRPr lang="en-US" sz="1200" dirty="0">
+              <a:solidFill>
+                <a:srgbClr val="CC3300"/>
+              </a:solidFill>
+            </a:endParaRPr>
+          </a:p>
+        </p:txBody>
+      </p:sp>
+      <p:pic>
+        <p:nvPicPr>
+          <p:cNvPr id="4" name="Picture 3"/>
+          <p:cNvPicPr>
+            <a:picLocks noChangeAspect="1"/>
+          </p:cNvPicPr>
+          <p:nvPr/>
+        </p:nvPicPr>
+        <p:blipFill>
+          <a:blip r:embed="rId6"/>
+          <a:stretch>
+            <a:fillRect/>
+          </a:stretch>
+        </p:blipFill>
+        <p:spPr>
+          <a:xfrm>
+            <a:off x="8109491" y="1981858"/>
+            <a:ext cx="311166" cy="336567"/>
+          </a:xfrm>
+          <a:prstGeom prst="rect">
+            <a:avLst/>
+          </a:prstGeom>
+        </p:spPr>
+      </p:pic>
+      <p:cxnSp>
+        <p:nvCxnSpPr>
+          <p:cNvPr id="104" name="Straight Connector 103"/>
+          <p:cNvCxnSpPr/>
+          <p:nvPr/>
+        </p:nvCxnSpPr>
+        <p:spPr>
+          <a:xfrm flipH="1" flipV="1">
+            <a:off x="5293597" y="1954709"/>
+            <a:ext cx="1183211" cy="448"/>
+          </a:xfrm>
+          <a:prstGeom prst="line">
+            <a:avLst/>
+          </a:prstGeom>
+          <a:ln w="28575">
+            <a:solidFill>
+              <a:srgbClr val="C00000"/>
+            </a:solidFill>
+          </a:ln>
+        </p:spPr>
+        <p:style>
+          <a:lnRef idx="3">
+            <a:schemeClr val="accent1"/>
+          </a:lnRef>
+          <a:fillRef idx="0">
+            <a:schemeClr val="accent1"/>
+          </a:fillRef>
+          <a:effectRef idx="2">
+            <a:schemeClr val="accent1"/>
+          </a:effectRef>
+          <a:fontRef idx="minor">
+            <a:schemeClr val="tx1"/>
+          </a:fontRef>
+        </p:style>
+      </p:cxnSp>
+      <p:cxnSp>
+        <p:nvCxnSpPr>
+          <p:cNvPr id="106" name="Straight Connector 105"/>
+          <p:cNvCxnSpPr/>
+          <p:nvPr/>
+        </p:nvCxnSpPr>
+        <p:spPr>
+          <a:xfrm flipH="1">
+            <a:off x="6485079" y="2479192"/>
+            <a:ext cx="2012721" cy="0"/>
+          </a:xfrm>
+          <a:prstGeom prst="line">
+            <a:avLst/>
+          </a:prstGeom>
+          <a:ln w="28575">
+            <a:solidFill>
+              <a:srgbClr val="C00000"/>
+            </a:solidFill>
+          </a:ln>
+        </p:spPr>
+        <p:style>
+          <a:lnRef idx="3">
+            <a:schemeClr val="accent1"/>
+          </a:lnRef>
+          <a:fillRef idx="0">
+            <a:schemeClr val="accent1"/>
+          </a:fillRef>
+          <a:effectRef idx="2">
+            <a:schemeClr val="accent1"/>
+          </a:effectRef>
+          <a:fontRef idx="minor">
+            <a:schemeClr val="tx1"/>
+          </a:fontRef>
+        </p:style>
+      </p:cxnSp>
+      <p:cxnSp>
+        <p:nvCxnSpPr>
+          <p:cNvPr id="112" name="Straight Connector 111"/>
+          <p:cNvCxnSpPr/>
+          <p:nvPr/>
+        </p:nvCxnSpPr>
+        <p:spPr>
+          <a:xfrm flipH="1" flipV="1">
+            <a:off x="6475903" y="1945084"/>
+            <a:ext cx="1329" cy="551040"/>
+          </a:xfrm>
+          <a:prstGeom prst="line">
+            <a:avLst/>
+          </a:prstGeom>
+          <a:ln w="28575">
+            <a:solidFill>
+              <a:srgbClr val="CC3300"/>
+            </a:solidFill>
+          </a:ln>
+        </p:spPr>
+        <p:style>
+          <a:lnRef idx="3">
+            <a:schemeClr val="accent1"/>
+          </a:lnRef>
+          <a:fillRef idx="0">
+            <a:schemeClr val="accent1"/>
+          </a:fillRef>
+          <a:effectRef idx="2">
+            <a:schemeClr val="accent1"/>
+          </a:effectRef>
+          <a:fontRef idx="minor">
+            <a:schemeClr val="tx1"/>
+          </a:fontRef>
+        </p:style>
+      </p:cxnSp>
+      <p:cxnSp>
+        <p:nvCxnSpPr>
+          <p:cNvPr id="122" name="Straight Connector 121"/>
+          <p:cNvCxnSpPr/>
+          <p:nvPr/>
+        </p:nvCxnSpPr>
+        <p:spPr>
+          <a:xfrm flipH="1" flipV="1">
+            <a:off x="6123834" y="2172267"/>
+            <a:ext cx="1861496" cy="6338"/>
+          </a:xfrm>
+          <a:prstGeom prst="line">
+            <a:avLst/>
+          </a:prstGeom>
+          <a:ln w="22225">
+            <a:solidFill>
+              <a:srgbClr val="6ED3F4"/>
+            </a:solidFill>
+          </a:ln>
+        </p:spPr>
+        <p:style>
+          <a:lnRef idx="3">
+            <a:schemeClr val="accent1"/>
+          </a:lnRef>
+          <a:fillRef idx="0">
+            <a:schemeClr val="accent1"/>
+          </a:fillRef>
+          <a:effectRef idx="2">
+            <a:schemeClr val="accent1"/>
+          </a:effectRef>
+          <a:fontRef idx="minor">
+            <a:schemeClr val="tx1"/>
+          </a:fontRef>
+        </p:style>
+      </p:cxnSp>
+      <p:cxnSp>
+        <p:nvCxnSpPr>
+          <p:cNvPr id="126" name="Straight Connector 125"/>
+          <p:cNvCxnSpPr/>
+          <p:nvPr/>
+        </p:nvCxnSpPr>
+        <p:spPr>
+          <a:xfrm flipH="1" flipV="1">
+            <a:off x="5341064" y="2044040"/>
+            <a:ext cx="789290" cy="1281"/>
+          </a:xfrm>
+          <a:prstGeom prst="line">
+            <a:avLst/>
+          </a:prstGeom>
+          <a:ln w="22225">
+            <a:solidFill>
+              <a:srgbClr val="6ED3F4"/>
+            </a:solidFill>
+            <a:tailEnd type="stealth" w="med" len="lg"/>
+          </a:ln>
+        </p:spPr>
+        <p:style>
+          <a:lnRef idx="3">
+            <a:schemeClr val="accent1"/>
+          </a:lnRef>
+          <a:fillRef idx="0">
+            <a:schemeClr val="accent1"/>
+          </a:fillRef>
+          <a:effectRef idx="2">
+            <a:schemeClr val="accent1"/>
+          </a:effectRef>
+          <a:fontRef idx="minor">
+            <a:schemeClr val="tx1"/>
+          </a:fontRef>
+        </p:style>
+      </p:cxnSp>
+      <p:cxnSp>
+        <p:nvCxnSpPr>
+          <p:cNvPr id="129" name="Straight Connector 128"/>
+          <p:cNvCxnSpPr/>
+          <p:nvPr/>
+        </p:nvCxnSpPr>
+        <p:spPr>
+          <a:xfrm flipH="1">
+            <a:off x="8445382" y="1940656"/>
+            <a:ext cx="1647" cy="209329"/>
+          </a:xfrm>
+          <a:prstGeom prst="line">
+            <a:avLst/>
+          </a:prstGeom>
+          <a:ln w="22225">
+            <a:solidFill>
+              <a:srgbClr val="6AD4F5"/>
+            </a:solidFill>
+          </a:ln>
+        </p:spPr>
+        <p:style>
+          <a:lnRef idx="3">
+            <a:schemeClr val="accent1"/>
+          </a:lnRef>
+          <a:fillRef idx="0">
+            <a:schemeClr val="accent1"/>
+          </a:fillRef>
+          <a:effectRef idx="2">
+            <a:schemeClr val="accent1"/>
+          </a:effectRef>
+          <a:fontRef idx="minor">
+            <a:schemeClr val="tx1"/>
+          </a:fontRef>
+        </p:style>
+      </p:cxnSp>
+      <p:cxnSp>
+        <p:nvCxnSpPr>
+          <p:cNvPr id="130" name="Straight Connector 129"/>
+          <p:cNvCxnSpPr/>
+          <p:nvPr/>
+        </p:nvCxnSpPr>
+        <p:spPr>
+          <a:xfrm flipH="1">
+            <a:off x="7979344" y="1940362"/>
+            <a:ext cx="1313" cy="237563"/>
+          </a:xfrm>
+          <a:prstGeom prst="line">
+            <a:avLst/>
+          </a:prstGeom>
+          <a:ln w="22225">
+            <a:solidFill>
+              <a:srgbClr val="6AD4F5"/>
+            </a:solidFill>
+          </a:ln>
+        </p:spPr>
+        <p:style>
+          <a:lnRef idx="3">
+            <a:schemeClr val="accent1"/>
+          </a:lnRef>
+          <a:fillRef idx="0">
+            <a:schemeClr val="accent1"/>
+          </a:fillRef>
+          <a:effectRef idx="2">
+            <a:schemeClr val="accent1"/>
+          </a:effectRef>
+          <a:fontRef idx="minor">
+            <a:schemeClr val="tx1"/>
+          </a:fontRef>
+        </p:style>
+      </p:cxnSp>
+      <p:cxnSp>
+        <p:nvCxnSpPr>
+          <p:cNvPr id="131" name="Straight Connector 130"/>
+          <p:cNvCxnSpPr/>
+          <p:nvPr/>
+        </p:nvCxnSpPr>
+        <p:spPr>
+          <a:xfrm>
+            <a:off x="6130354" y="2044040"/>
+            <a:ext cx="394" cy="127511"/>
+          </a:xfrm>
+          <a:prstGeom prst="line">
+            <a:avLst/>
+          </a:prstGeom>
+          <a:ln w="22225">
+            <a:solidFill>
+              <a:srgbClr val="6AD4F5"/>
+            </a:solidFill>
+          </a:ln>
+        </p:spPr>
+        <p:style>
+          <a:lnRef idx="3">
+            <a:schemeClr val="accent1"/>
+          </a:lnRef>
+          <a:fillRef idx="0">
+            <a:schemeClr val="accent1"/>
+          </a:fillRef>
+          <a:effectRef idx="2">
+            <a:schemeClr val="accent1"/>
+          </a:effectRef>
+          <a:fontRef idx="minor">
+            <a:schemeClr val="tx1"/>
+          </a:fontRef>
+        </p:style>
+      </p:cxnSp>
+      <p:cxnSp>
+        <p:nvCxnSpPr>
+          <p:cNvPr id="140" name="Straight Connector 139"/>
+          <p:cNvCxnSpPr/>
+          <p:nvPr/>
+        </p:nvCxnSpPr>
+        <p:spPr>
+          <a:xfrm flipH="1">
+            <a:off x="7974295" y="1951179"/>
+            <a:ext cx="469742" cy="1430"/>
+          </a:xfrm>
+          <a:prstGeom prst="line">
+            <a:avLst/>
+          </a:prstGeom>
+          <a:ln w="22225">
+            <a:solidFill>
+              <a:srgbClr val="6ED3F4"/>
+            </a:solidFill>
+          </a:ln>
+        </p:spPr>
+        <p:style>
+          <a:lnRef idx="3">
+            <a:schemeClr val="accent1"/>
+          </a:lnRef>
+          <a:fillRef idx="0">
+            <a:schemeClr val="accent1"/>
+          </a:fillRef>
+          <a:effectRef idx="2">
+            <a:schemeClr val="accent1"/>
+          </a:effectRef>
+          <a:fontRef idx="minor">
+            <a:schemeClr val="tx1"/>
+          </a:fontRef>
+        </p:style>
+      </p:cxnSp>
+      <p:cxnSp>
+        <p:nvCxnSpPr>
+          <p:cNvPr id="150" name="Straight Connector 149"/>
+          <p:cNvCxnSpPr/>
+          <p:nvPr/>
+        </p:nvCxnSpPr>
+        <p:spPr>
+          <a:xfrm>
+            <a:off x="8380405" y="2142112"/>
+            <a:ext cx="76854" cy="615"/>
+          </a:xfrm>
+          <a:prstGeom prst="line">
+            <a:avLst/>
+          </a:prstGeom>
+          <a:ln w="22225">
+            <a:solidFill>
+              <a:srgbClr val="6ED3F4"/>
+            </a:solidFill>
+          </a:ln>
+        </p:spPr>
+        <p:style>
+          <a:lnRef idx="3">
+            <a:schemeClr val="accent1"/>
+          </a:lnRef>
+          <a:fillRef idx="0">
+            <a:schemeClr val="accent1"/>
+          </a:fillRef>
+          <a:effectRef idx="2">
+            <a:schemeClr val="accent1"/>
+          </a:effectRef>
+          <a:fontRef idx="minor">
+            <a:schemeClr val="tx1"/>
+          </a:fontRef>
+        </p:style>
+      </p:cxnSp>
+      <p:sp>
+        <p:nvSpPr>
+          <p:cNvPr id="170" name="TextBox 169"/>
+          <p:cNvSpPr txBox="1"/>
+          <p:nvPr/>
+        </p:nvSpPr>
+        <p:spPr>
+          <a:xfrm>
+            <a:off x="5086073" y="248152"/>
+            <a:ext cx="245039" cy="276999"/>
+          </a:xfrm>
+          <a:prstGeom prst="rect">
+            <a:avLst/>
+          </a:prstGeom>
+          <a:noFill/>
+        </p:spPr>
+        <p:txBody>
+          <a:bodyPr wrap="square" rtlCol="0">
+            <a:spAutoFit/>
+          </a:bodyPr>
+          <a:lstStyle/>
+          <a:p>
+            <a:r>
+              <a:rPr lang="en-US" sz="1200" dirty="0" smtClean="0">
+                <a:solidFill>
+                  <a:srgbClr val="CC3300"/>
+                </a:solidFill>
+              </a:rPr>
+              <a:t>0</a:t>
+            </a:r>
+            <a:endParaRPr lang="en-US" sz="1200" dirty="0">
+              <a:solidFill>
+                <a:srgbClr val="CC3300"/>
+              </a:solidFill>
+            </a:endParaRPr>
+          </a:p>
+        </p:txBody>
+      </p:sp>
+      <p:sp>
+        <p:nvSpPr>
+          <p:cNvPr id="173" name="TextBox 172"/>
+          <p:cNvSpPr txBox="1"/>
+          <p:nvPr/>
+        </p:nvSpPr>
+        <p:spPr>
+          <a:xfrm>
+            <a:off x="5087191" y="438998"/>
+            <a:ext cx="245039" cy="276999"/>
+          </a:xfrm>
+          <a:prstGeom prst="rect">
+            <a:avLst/>
+          </a:prstGeom>
+          <a:noFill/>
+        </p:spPr>
+        <p:txBody>
+          <a:bodyPr wrap="square" rtlCol="0">
+            <a:spAutoFit/>
+          </a:bodyPr>
+          <a:lstStyle/>
+          <a:p>
+            <a:r>
+              <a:rPr lang="en-US" sz="1200" dirty="0" smtClean="0">
+                <a:solidFill>
+                  <a:srgbClr val="CC3300"/>
+                </a:solidFill>
+              </a:rPr>
+              <a:t>1</a:t>
+            </a:r>
+            <a:endParaRPr lang="en-US" sz="1200" dirty="0">
               <a:solidFill>
                 <a:srgbClr val="CC3300"/>
               </a:solidFill>

</xml_diff>